<commit_message>
Inclusão do Eixo 1
</commit_message>
<xml_diff>
--- a/Eixo2/Portifólio de Projetos Eixo 2.pptx
+++ b/Eixo2/Portifólio de Projetos Eixo 2.pptx
@@ -5027,7 +5027,7 @@
                   <a:schemeClr val="bg1"/>
                 </a:solidFill>
               </a:rPr>
-              <a:t>EIXO 5</a:t>
+              <a:t>EIXO 2</a:t>
             </a:r>
           </a:p>
         </p:txBody>
@@ -5047,7 +5047,7 @@
         <p:spPr>
           <a:xfrm>
             <a:off x="1555522" y="6140983"/>
-            <a:ext cx="4239064" cy="369332"/>
+            <a:ext cx="5341208" cy="369332"/>
           </a:xfrm>
           <a:prstGeom prst="rect">
             <a:avLst/>
@@ -5057,7 +5057,7 @@
           </a:solidFill>
         </p:spPr>
         <p:txBody>
-          <a:bodyPr wrap="none" lIns="180000" rIns="180000" rtlCol="0">
+          <a:bodyPr wrap="square" lIns="180000" rIns="180000" rtlCol="0">
             <a:spAutoFit/>
           </a:bodyPr>
           <a:lstStyle/>
@@ -5068,7 +5068,7 @@
                   <a:srgbClr val="0D1F2D"/>
                 </a:solidFill>
               </a:rPr>
-              <a:t>IMPLEMENTAÇÃO DE REDES SEGURAS</a:t>
+              <a:t>Arquiteturas, Tecnologias e Protocolos de Redes</a:t>
             </a:r>
           </a:p>
         </p:txBody>
@@ -5251,7 +5251,7 @@
         <p:spPr>
           <a:xfrm>
             <a:off x="758172" y="3304786"/>
-            <a:ext cx="1247457" cy="461665"/>
+            <a:ext cx="1184940" cy="461665"/>
           </a:xfrm>
           <a:prstGeom prst="rect">
             <a:avLst/>
@@ -5271,7 +5271,7 @@
                 </a:solidFill>
                 <a:hlinkClick r:id="rId3"/>
               </a:rPr>
-              <a:t>Grupo 1</a:t>
+              <a:t>Grupo1</a:t>
             </a:r>
             <a:endParaRPr lang="pt-BR" sz="2400" dirty="0">
               <a:solidFill>
@@ -5317,96 +5317,6 @@
                 <a:hlinkClick r:id="rId4"/>
               </a:rPr>
               <a:t>Grupo 2</a:t>
-            </a:r>
-            <a:endParaRPr lang="pt-BR" sz="2400" dirty="0">
-              <a:solidFill>
-                <a:srgbClr val="0D1F2D"/>
-              </a:solidFill>
-            </a:endParaRPr>
-          </a:p>
-        </p:txBody>
-      </p:sp>
-      <p:sp>
-        <p:nvSpPr>
-          <p:cNvPr id="33" name="TextBox 32">
-            <a:extLst>
-              <a:ext uri="{FF2B5EF4-FFF2-40B4-BE49-F238E27FC236}">
-                <a16:creationId xmlns:a16="http://schemas.microsoft.com/office/drawing/2014/main" id="{6765409A-BFB5-50D2-F5A9-7137080FC766}"/>
-              </a:ext>
-            </a:extLst>
-          </p:cNvPr>
-          <p:cNvSpPr txBox="1"/>
-          <p:nvPr/>
-        </p:nvSpPr>
-        <p:spPr>
-          <a:xfrm>
-            <a:off x="758172" y="4231342"/>
-            <a:ext cx="1247457" cy="461665"/>
-          </a:xfrm>
-          <a:prstGeom prst="rect">
-            <a:avLst/>
-          </a:prstGeom>
-          <a:noFill/>
-        </p:spPr>
-        <p:txBody>
-          <a:bodyPr wrap="none" rtlCol="0">
-            <a:spAutoFit/>
-          </a:bodyPr>
-          <a:lstStyle/>
-          <a:p>
-            <a:r>
-              <a:rPr lang="pt-BR" sz="2400" dirty="0">
-                <a:solidFill>
-                  <a:srgbClr val="0D1F2D"/>
-                </a:solidFill>
-                <a:hlinkClick r:id="rId5"/>
-              </a:rPr>
-              <a:t>Grupo 3</a:t>
-            </a:r>
-            <a:endParaRPr lang="pt-BR" sz="2400" dirty="0">
-              <a:solidFill>
-                <a:srgbClr val="0D1F2D"/>
-              </a:solidFill>
-            </a:endParaRPr>
-          </a:p>
-        </p:txBody>
-      </p:sp>
-      <p:sp>
-        <p:nvSpPr>
-          <p:cNvPr id="34" name="TextBox 33">
-            <a:extLst>
-              <a:ext uri="{FF2B5EF4-FFF2-40B4-BE49-F238E27FC236}">
-                <a16:creationId xmlns:a16="http://schemas.microsoft.com/office/drawing/2014/main" id="{1C652A1C-468C-F1AC-EBE9-AE1DB1071AA8}"/>
-              </a:ext>
-            </a:extLst>
-          </p:cNvPr>
-          <p:cNvSpPr txBox="1"/>
-          <p:nvPr/>
-        </p:nvSpPr>
-        <p:spPr>
-          <a:xfrm>
-            <a:off x="758172" y="4694619"/>
-            <a:ext cx="1247457" cy="461665"/>
-          </a:xfrm>
-          <a:prstGeom prst="rect">
-            <a:avLst/>
-          </a:prstGeom>
-          <a:noFill/>
-        </p:spPr>
-        <p:txBody>
-          <a:bodyPr wrap="none" rtlCol="0">
-            <a:spAutoFit/>
-          </a:bodyPr>
-          <a:lstStyle/>
-          <a:p>
-            <a:r>
-              <a:rPr lang="pt-BR" sz="2400" dirty="0">
-                <a:solidFill>
-                  <a:srgbClr val="0D1F2D"/>
-                </a:solidFill>
-                <a:hlinkClick r:id="rId6"/>
-              </a:rPr>
-              <a:t>Grupo 4</a:t>
             </a:r>
             <a:endParaRPr lang="pt-BR" sz="2400" dirty="0">
               <a:solidFill>
@@ -5655,144 +5565,9 @@
                 <a:solidFill>
                   <a:srgbClr val="0D1F2D"/>
                 </a:solidFill>
-                <a:hlinkClick r:id="rId7"/>
+                <a:hlinkClick r:id="rId5"/>
               </a:rPr>
               <a:t>Grupo 1</a:t>
-            </a:r>
-            <a:endParaRPr lang="pt-BR" sz="2400" dirty="0">
-              <a:solidFill>
-                <a:srgbClr val="0D1F2D"/>
-              </a:solidFill>
-            </a:endParaRPr>
-          </a:p>
-        </p:txBody>
-      </p:sp>
-      <p:sp>
-        <p:nvSpPr>
-          <p:cNvPr id="28" name="TextBox 27">
-            <a:extLst>
-              <a:ext uri="{FF2B5EF4-FFF2-40B4-BE49-F238E27FC236}">
-                <a16:creationId xmlns:a16="http://schemas.microsoft.com/office/drawing/2014/main" id="{1BE66FE3-D9DC-25BA-93AB-AAEAA4141AE5}"/>
-              </a:ext>
-            </a:extLst>
-          </p:cNvPr>
-          <p:cNvSpPr txBox="1"/>
-          <p:nvPr/>
-        </p:nvSpPr>
-        <p:spPr>
-          <a:xfrm>
-            <a:off x="3398608" y="3768064"/>
-            <a:ext cx="1247457" cy="461665"/>
-          </a:xfrm>
-          <a:prstGeom prst="rect">
-            <a:avLst/>
-          </a:prstGeom>
-          <a:noFill/>
-        </p:spPr>
-        <p:txBody>
-          <a:bodyPr wrap="none" rtlCol="0">
-            <a:spAutoFit/>
-          </a:bodyPr>
-          <a:lstStyle/>
-          <a:p>
-            <a:r>
-              <a:rPr lang="pt-BR" sz="2400" dirty="0">
-                <a:solidFill>
-                  <a:srgbClr val="0D1F2D"/>
-                </a:solidFill>
-                <a:hlinkClick r:id="rId8"/>
-              </a:rPr>
-              <a:t>Grupo 2</a:t>
-            </a:r>
-            <a:endParaRPr lang="pt-BR" sz="2400" dirty="0">
-              <a:solidFill>
-                <a:srgbClr val="0D1F2D"/>
-              </a:solidFill>
-            </a:endParaRPr>
-          </a:p>
-        </p:txBody>
-      </p:sp>
-      <p:sp>
-        <p:nvSpPr>
-          <p:cNvPr id="35" name="TextBox 34">
-            <a:extLst>
-              <a:ext uri="{FF2B5EF4-FFF2-40B4-BE49-F238E27FC236}">
-                <a16:creationId xmlns:a16="http://schemas.microsoft.com/office/drawing/2014/main" id="{4CD51440-5744-BA74-956C-02556B2D7367}"/>
-              </a:ext>
-            </a:extLst>
-          </p:cNvPr>
-          <p:cNvSpPr txBox="1"/>
-          <p:nvPr/>
-        </p:nvSpPr>
-        <p:spPr>
-          <a:xfrm>
-            <a:off x="3398608" y="4231342"/>
-            <a:ext cx="1247457" cy="461665"/>
-          </a:xfrm>
-          <a:prstGeom prst="rect">
-            <a:avLst/>
-          </a:prstGeom>
-          <a:noFill/>
-        </p:spPr>
-        <p:txBody>
-          <a:bodyPr wrap="none" rtlCol="0">
-            <a:spAutoFit/>
-          </a:bodyPr>
-          <a:lstStyle/>
-          <a:p>
-            <a:r>
-              <a:rPr lang="pt-BR" sz="2400" dirty="0">
-                <a:solidFill>
-                  <a:srgbClr val="0D1F2D"/>
-                </a:solidFill>
-                <a:hlinkClick r:id="rId9"/>
-              </a:rPr>
-              <a:t>Grupo 3</a:t>
-            </a:r>
-            <a:endParaRPr lang="pt-BR" sz="2400" dirty="0">
-              <a:solidFill>
-                <a:srgbClr val="0D1F2D"/>
-              </a:solidFill>
-            </a:endParaRPr>
-          </a:p>
-        </p:txBody>
-      </p:sp>
-      <p:sp>
-        <p:nvSpPr>
-          <p:cNvPr id="36" name="TextBox 35">
-            <a:extLst>
-              <a:ext uri="{FF2B5EF4-FFF2-40B4-BE49-F238E27FC236}">
-                <a16:creationId xmlns:a16="http://schemas.microsoft.com/office/drawing/2014/main" id="{D7C660FD-4E59-FF56-7A9F-83652A950045}"/>
-              </a:ext>
-            </a:extLst>
-          </p:cNvPr>
-          <p:cNvSpPr txBox="1"/>
-          <p:nvPr/>
-        </p:nvSpPr>
-        <p:spPr>
-          <a:xfrm>
-            <a:off x="3398608" y="4694619"/>
-            <a:ext cx="1247457" cy="461665"/>
-          </a:xfrm>
-          <a:prstGeom prst="rect">
-            <a:avLst/>
-          </a:prstGeom>
-          <a:noFill/>
-        </p:spPr>
-        <p:txBody>
-          <a:bodyPr wrap="none" rtlCol="0">
-            <a:spAutoFit/>
-          </a:bodyPr>
-          <a:lstStyle/>
-          <a:p>
-            <a:r>
-              <a:rPr lang="pt-BR" sz="2400" dirty="0">
-                <a:solidFill>
-                  <a:srgbClr val="0D1F2D"/>
-                </a:solidFill>
-                <a:hlinkClick r:id="rId10"/>
-              </a:rPr>
-              <a:t>Grupo 4</a:t>
             </a:r>
             <a:endParaRPr lang="pt-BR" sz="2400" dirty="0">
               <a:solidFill>

</xml_diff>